<commit_message>
Changed a few things in backend, made everything work (not look good, not the same thing) in the front end, and also finished the presentation
</commit_message>
<xml_diff>
--- a/Documentation/REpont Plusz 2035. 03. 28..pptx
+++ b/Documentation/REpont Plusz 2035. 03. 28..pptx
@@ -1,14 +1,14 @@
 
 <file path=ppt/presentation.xml><?xml version="1.0" encoding="utf-8"?>
-<p:presentation xmlns:a="http://schemas.openxmlformats.org/drawingml/2006/main" xmlns:r="http://schemas.openxmlformats.org/officeDocument/2006/relationships" xmlns:p="http://schemas.openxmlformats.org/presentationml/2006/main" removePersonalInfoOnSave="1" autoCompressPictures="0">
+<p:presentation xmlns:a="http://schemas.openxmlformats.org/drawingml/2006/main" xmlns:r="http://schemas.openxmlformats.org/officeDocument/2006/relationships" xmlns:p="http://schemas.openxmlformats.org/presentationml/2006/main" autoCompressPictures="0">
   <p:sldMasterIdLst>
     <p:sldMasterId id="2147483822" r:id="rId4"/>
   </p:sldMasterIdLst>
   <p:notesMasterIdLst>
-    <p:notesMasterId r:id="rId13"/>
+    <p:notesMasterId r:id="rId14"/>
   </p:notesMasterIdLst>
   <p:handoutMasterIdLst>
-    <p:handoutMasterId r:id="rId14"/>
+    <p:handoutMasterId r:id="rId15"/>
   </p:handoutMasterIdLst>
   <p:sldIdLst>
     <p:sldId id="256" r:id="rId5"/>
@@ -17,8 +17,9 @@
     <p:sldId id="259" r:id="rId8"/>
     <p:sldId id="267" r:id="rId9"/>
     <p:sldId id="268" r:id="rId10"/>
-    <p:sldId id="266" r:id="rId11"/>
-    <p:sldId id="263" r:id="rId12"/>
+    <p:sldId id="269" r:id="rId11"/>
+    <p:sldId id="266" r:id="rId12"/>
+    <p:sldId id="263" r:id="rId13"/>
   </p:sldIdLst>
   <p:sldSz cx="12192000" cy="6858000"/>
   <p:notesSz cx="6858000" cy="9144000"/>
@@ -222,7 +223,7 @@
           <a:p>
             <a:fld id="{0AD3DE1A-2241-45DA-954B-4A1CB50EE7E1}" type="datetimeFigureOut">
               <a:rPr lang="hu-HU" smtClean="0"/>
-              <a:t>2025. 03. 28.</a:t>
+              <a:t>2025. 03. 30.</a:t>
             </a:fld>
             <a:endParaRPr lang="hu-HU"/>
           </a:p>
@@ -400,7 +401,7 @@
           <a:p>
             <a:fld id="{97B157C7-EA57-4A28-9B4E-427CDD8FDBDF}" type="datetimeFigureOut">
               <a:rPr lang="hu-HU" noProof="0" smtClean="0"/>
-              <a:t>2025. 03. 28.</a:t>
+              <a:t>2025. 03. 30.</a:t>
             </a:fld>
             <a:endParaRPr lang="hu-HU" noProof="0"/>
           </a:p>
@@ -985,7 +986,7 @@
           <a:p>
             <a:fld id="{E72825A0-BAE9-473A-A056-FD986C8B0900}" type="slidenum">
               <a:rPr lang="hu-HU" noProof="0" smtClean="0"/>
-              <a:t>7</a:t>
+              <a:t>8</a:t>
             </a:fld>
             <a:endParaRPr lang="hu-HU" noProof="0"/>
           </a:p>
@@ -1069,7 +1070,7 @@
           <a:p>
             <a:fld id="{E72825A0-BAE9-473A-A056-FD986C8B0900}" type="slidenum">
               <a:rPr lang="hu-HU" noProof="0" smtClean="0"/>
-              <a:t>8</a:t>
+              <a:t>9</a:t>
             </a:fld>
             <a:endParaRPr lang="hu-HU" noProof="0"/>
           </a:p>
@@ -1259,7 +1260,7 @@
             <a:pPr rtl="0"/>
             <a:fld id="{8722D6C1-A2FD-45AC-A538-FCE9A6401F42}" type="datetime1">
               <a:rPr lang="hu-HU" noProof="0" smtClean="0"/>
-              <a:t>2025. 03. 28.</a:t>
+              <a:t>2025. 03. 30.</a:t>
             </a:fld>
             <a:endParaRPr lang="hu-HU" noProof="0"/>
           </a:p>
@@ -1533,7 +1534,7 @@
             <a:pPr rtl="0"/>
             <a:fld id="{C2CD5ED6-9936-4E53-BDEE-012FAF83479A}" type="datetime1">
               <a:rPr lang="hu-HU" noProof="0" smtClean="0"/>
-              <a:t>2025. 03. 28.</a:t>
+              <a:t>2025. 03. 30.</a:t>
             </a:fld>
             <a:endParaRPr lang="hu-HU" noProof="0"/>
           </a:p>
@@ -1772,7 +1773,7 @@
             <a:pPr rtl="0"/>
             <a:fld id="{D7B0B103-54F9-4700-86B8-803916FCFD73}" type="datetime1">
               <a:rPr lang="hu-HU" noProof="0" smtClean="0"/>
-              <a:t>2025. 03. 28.</a:t>
+              <a:t>2025. 03. 30.</a:t>
             </a:fld>
             <a:endParaRPr lang="hu-HU" noProof="0"/>
           </a:p>
@@ -2090,7 +2091,7 @@
             <a:pPr rtl="0"/>
             <a:fld id="{BEF47BD2-A5D7-47AF-80DF-503B159DF1E0}" type="datetime1">
               <a:rPr lang="hu-HU" noProof="0" smtClean="0"/>
-              <a:t>2025. 03. 28.</a:t>
+              <a:t>2025. 03. 30.</a:t>
             </a:fld>
             <a:endParaRPr lang="hu-HU" noProof="0"/>
           </a:p>
@@ -2571,7 +2572,7 @@
             <a:pPr rtl="0"/>
             <a:fld id="{A77D77DC-4028-4DFA-A617-124FE0632CFD}" type="datetime1">
               <a:rPr lang="hu-HU" noProof="0" smtClean="0"/>
-              <a:t>2025. 03. 28.</a:t>
+              <a:t>2025. 03. 30.</a:t>
             </a:fld>
             <a:endParaRPr lang="hu-HU" noProof="0"/>
           </a:p>
@@ -3126,7 +3127,7 @@
             <a:pPr rtl="0"/>
             <a:fld id="{D8DC576A-9893-48E8-AD4C-A5E2563C8FBE}" type="datetime1">
               <a:rPr lang="hu-HU" noProof="0" smtClean="0"/>
-              <a:t>2025. 03. 28.</a:t>
+              <a:t>2025. 03. 30.</a:t>
             </a:fld>
             <a:endParaRPr lang="hu-HU" noProof="0"/>
           </a:p>
@@ -3908,7 +3909,7 @@
             <a:pPr rtl="0"/>
             <a:fld id="{497E3476-FC43-404D-8C09-460EF139B478}" type="datetime1">
               <a:rPr lang="hu-HU" noProof="0" smtClean="0"/>
-              <a:t>2025. 03. 28.</a:t>
+              <a:t>2025. 03. 30.</a:t>
             </a:fld>
             <a:endParaRPr lang="hu-HU" noProof="0"/>
           </a:p>
@@ -4090,7 +4091,7 @@
             <a:pPr rtl="0"/>
             <a:fld id="{0CB34953-DD07-4A3B-B33E-D5C651C3BE02}" type="datetime1">
               <a:rPr lang="hu-HU" noProof="0" smtClean="0"/>
-              <a:t>2025. 03. 28.</a:t>
+              <a:t>2025. 03. 30.</a:t>
             </a:fld>
             <a:endParaRPr lang="hu-HU" noProof="0"/>
           </a:p>
@@ -4319,7 +4320,7 @@
             <a:pPr rtl="0"/>
             <a:fld id="{3759C7DD-A91D-4706-8584-33B8614A085C}" type="datetime1">
               <a:rPr lang="hu-HU" noProof="0" smtClean="0"/>
-              <a:t>2025. 03. 28.</a:t>
+              <a:t>2025. 03. 30.</a:t>
             </a:fld>
             <a:endParaRPr lang="hu-HU" noProof="0"/>
           </a:p>
@@ -4505,7 +4506,7 @@
             <a:pPr rtl="0"/>
             <a:fld id="{F169964A-3DCD-4016-9803-1FE60F631006}" type="datetime1">
               <a:rPr lang="hu-HU" noProof="0" smtClean="0"/>
-              <a:t>2025. 03. 28.</a:t>
+              <a:t>2025. 03. 30.</a:t>
             </a:fld>
             <a:endParaRPr lang="hu-HU" noProof="0"/>
           </a:p>
@@ -4801,7 +4802,7 @@
             <a:pPr rtl="0"/>
             <a:fld id="{14C94FBE-12F4-446E-B387-376A7496542D}" type="datetime1">
               <a:rPr lang="hu-HU" noProof="0" smtClean="0"/>
-              <a:t>2025. 03. 28.</a:t>
+              <a:t>2025. 03. 30.</a:t>
             </a:fld>
             <a:endParaRPr lang="hu-HU" noProof="0"/>
           </a:p>
@@ -5048,7 +5049,7 @@
             <a:pPr rtl="0"/>
             <a:fld id="{476027C6-9B6A-43D4-84EA-31BF0C736873}" type="datetime1">
               <a:rPr lang="hu-HU" noProof="0" smtClean="0"/>
-              <a:t>2025. 03. 28.</a:t>
+              <a:t>2025. 03. 30.</a:t>
             </a:fld>
             <a:endParaRPr lang="hu-HU" noProof="0"/>
           </a:p>
@@ -5432,7 +5433,7 @@
             <a:pPr rtl="0"/>
             <a:fld id="{61E764EF-CAD5-4612-B049-2ABFE6F84041}" type="datetime1">
               <a:rPr lang="hu-HU" noProof="0" smtClean="0"/>
-              <a:t>2025. 03. 28.</a:t>
+              <a:t>2025. 03. 30.</a:t>
             </a:fld>
             <a:endParaRPr lang="hu-HU" noProof="0"/>
           </a:p>
@@ -5557,7 +5558,7 @@
             <a:pPr rtl="0"/>
             <a:fld id="{C3066753-3AEE-4AB8-A474-C5ED4EC554CB}" type="datetime1">
               <a:rPr lang="hu-HU" noProof="0" smtClean="0"/>
-              <a:t>2025. 03. 28.</a:t>
+              <a:t>2025. 03. 30.</a:t>
             </a:fld>
             <a:endParaRPr lang="hu-HU" noProof="0"/>
           </a:p>
@@ -5659,7 +5660,7 @@
             <a:pPr rtl="0"/>
             <a:fld id="{C0640860-2E32-442C-9049-2730316D8837}" type="datetime1">
               <a:rPr lang="hu-HU" noProof="0" smtClean="0"/>
-              <a:t>2025. 03. 28.</a:t>
+              <a:t>2025. 03. 30.</a:t>
             </a:fld>
             <a:endParaRPr lang="hu-HU" noProof="0"/>
           </a:p>
@@ -5914,7 +5915,7 @@
             <a:pPr rtl="0"/>
             <a:fld id="{421ABF0A-E69E-4A70-9488-E2045B1FA08F}" type="datetime1">
               <a:rPr lang="hu-HU" noProof="0" smtClean="0"/>
-              <a:t>2025. 03. 28.</a:t>
+              <a:t>2025. 03. 30.</a:t>
             </a:fld>
             <a:endParaRPr lang="hu-HU" noProof="0"/>
           </a:p>
@@ -6178,7 +6179,7 @@
             <a:pPr rtl="0"/>
             <a:fld id="{6CA845CD-F060-4709-9FC0-4CDC42D0AE09}" type="datetime1">
               <a:rPr lang="hu-HU" noProof="0" smtClean="0"/>
-              <a:t>2025. 03. 28.</a:t>
+              <a:t>2025. 03. 30.</a:t>
             </a:fld>
             <a:endParaRPr lang="hu-HU" noProof="0"/>
           </a:p>
@@ -6427,7 +6428,7 @@
             <a:pPr rtl="0"/>
             <a:fld id="{9E27A629-379B-4B9A-8234-4BE692ACD0A5}" type="datetime1">
               <a:rPr lang="hu-HU" noProof="0" smtClean="0"/>
-              <a:t>2025. 03. 28.</a:t>
+              <a:t>2025. 03. 30.</a:t>
             </a:fld>
             <a:endParaRPr lang="hu-HU" noProof="0"/>
           </a:p>
@@ -7126,6 +7127,9 @@
                     <p:cTn id="3" fill="hold">
                       <p:stCondLst>
                         <p:cond delay="indefinite"/>
+                        <p:cond evt="onBegin" delay="0">
+                          <p:tn val="2"/>
+                        </p:cond>
                       </p:stCondLst>
                       <p:childTnLst>
                         <p:par>
@@ -7135,7 +7139,7 @@
                             </p:stCondLst>
                             <p:childTnLst>
                               <p:par>
-                                <p:cTn id="5" presetID="2" presetClass="entr" presetSubtype="4" fill="hold" grpId="0" nodeType="clickEffect">
+                                <p:cTn id="5" presetID="2" presetClass="entr" presetSubtype="4" fill="hold" grpId="0" nodeType="withEffect">
                                   <p:stCondLst>
                                     <p:cond delay="0"/>
                                   </p:stCondLst>
@@ -7207,33 +7211,15 @@
                                   </p:childTnLst>
                                 </p:cTn>
                               </p:par>
-                            </p:childTnLst>
-                          </p:cTn>
-                        </p:par>
-                      </p:childTnLst>
-                    </p:cTn>
-                  </p:par>
-                  <p:par>
-                    <p:cTn id="9" fill="hold">
-                      <p:stCondLst>
-                        <p:cond delay="indefinite"/>
-                      </p:stCondLst>
-                      <p:childTnLst>
-                        <p:par>
-                          <p:cTn id="10" fill="hold">
-                            <p:stCondLst>
-                              <p:cond delay="0"/>
-                            </p:stCondLst>
-                            <p:childTnLst>
                               <p:par>
-                                <p:cTn id="11" presetID="2" presetClass="entr" presetSubtype="4" fill="hold" grpId="0" nodeType="clickEffect">
+                                <p:cTn id="9" presetID="2" presetClass="entr" presetSubtype="4" fill="hold" grpId="0" nodeType="withEffect">
                                   <p:stCondLst>
-                                    <p:cond delay="0"/>
+                                    <p:cond delay="500"/>
                                   </p:stCondLst>
                                   <p:childTnLst>
                                     <p:set>
                                       <p:cBhvr>
-                                        <p:cTn id="12" dur="1" fill="hold">
+                                        <p:cTn id="10" dur="1" fill="hold">
                                           <p:stCondLst>
                                             <p:cond delay="0"/>
                                           </p:stCondLst>
@@ -7255,7 +7241,7 @@
                                     </p:set>
                                     <p:anim calcmode="lin" valueType="num">
                                       <p:cBhvr additive="base">
-                                        <p:cTn id="13" dur="500" fill="hold"/>
+                                        <p:cTn id="11" dur="500" fill="hold"/>
                                         <p:tgtEl>
                                           <p:spTgt spid="3">
                                             <p:txEl>
@@ -7282,7 +7268,7 @@
                                     </p:anim>
                                     <p:anim calcmode="lin" valueType="num">
                                       <p:cBhvr additive="base">
-                                        <p:cTn id="14" dur="500" fill="hold"/>
+                                        <p:cTn id="12" dur="500" fill="hold"/>
                                         <p:tgtEl>
                                           <p:spTgt spid="3">
                                             <p:txEl>
@@ -7467,6 +7453,9 @@
                     <p:cTn id="3" fill="hold">
                       <p:stCondLst>
                         <p:cond delay="indefinite"/>
+                        <p:cond evt="onBegin" delay="0">
+                          <p:tn val="2"/>
+                        </p:cond>
                       </p:stCondLst>
                       <p:childTnLst>
                         <p:par>
@@ -7476,7 +7465,7 @@
                             </p:stCondLst>
                             <p:childTnLst>
                               <p:par>
-                                <p:cTn id="5" presetID="26" presetClass="entr" presetSubtype="0" fill="hold" grpId="0" nodeType="clickEffect">
+                                <p:cTn id="5" presetID="26" presetClass="entr" presetSubtype="0" fill="hold" grpId="0" nodeType="withEffect">
                                   <p:stCondLst>
                                     <p:cond delay="0"/>
                                   </p:stCondLst>
@@ -8937,6 +8926,9 @@
                     <p:cTn id="3" fill="hold">
                       <p:stCondLst>
                         <p:cond delay="indefinite"/>
+                        <p:cond evt="onBegin" delay="0">
+                          <p:tn val="2"/>
+                        </p:cond>
                       </p:stCondLst>
                       <p:childTnLst>
                         <p:par>
@@ -8946,7 +8938,7 @@
                             </p:stCondLst>
                             <p:childTnLst>
                               <p:par>
-                                <p:cTn id="5" presetID="26" presetClass="entr" presetSubtype="0" fill="hold" grpId="0" nodeType="clickEffect">
+                                <p:cTn id="5" presetID="26" presetClass="entr" presetSubtype="0" fill="hold" grpId="0" nodeType="withEffect">
                                   <p:stCondLst>
                                     <p:cond delay="0"/>
                                   </p:stCondLst>
@@ -9756,6 +9748,9 @@
                     <p:cTn id="3" fill="hold">
                       <p:stCondLst>
                         <p:cond delay="indefinite"/>
+                        <p:cond evt="onBegin" delay="0">
+                          <p:tn val="2"/>
+                        </p:cond>
                       </p:stCondLst>
                       <p:childTnLst>
                         <p:par>
@@ -9765,7 +9760,7 @@
                             </p:stCondLst>
                             <p:childTnLst>
                               <p:par>
-                                <p:cTn id="5" presetID="42" presetClass="entr" presetSubtype="0" fill="hold" grpId="0" nodeType="clickEffect">
+                                <p:cTn id="5" presetID="42" presetClass="entr" presetSubtype="0" fill="hold" grpId="0" nodeType="withEffect">
                                   <p:stCondLst>
                                     <p:cond delay="0"/>
                                   </p:stCondLst>
@@ -10247,8 +10242,8 @@
         </p:blipFill>
         <p:spPr>
           <a:xfrm>
-            <a:off x="4656504" y="2311401"/>
-            <a:ext cx="3065096" cy="3187700"/>
+            <a:off x="5258350" y="2159316"/>
+            <a:ext cx="1861403" cy="1935859"/>
           </a:xfrm>
           <a:prstGeom prst="rect">
             <a:avLst/>
@@ -10262,8 +10257,78 @@
             </a:glow>
             <a:reflection blurRad="6350" stA="52000" endA="300" endPos="35000" dir="5400000" sy="-100000" algn="bl" rotWithShape="0"/>
           </a:effectLst>
+        </p:spPr>
+      </p:pic>
+      <p:pic>
+        <p:nvPicPr>
+          <p:cNvPr id="7" name="Picture 6">
+            <a:extLst>
+              <a:ext uri="{FF2B5EF4-FFF2-40B4-BE49-F238E27FC236}">
+                <a16:creationId xmlns:a16="http://schemas.microsoft.com/office/drawing/2014/main" id="{E35FD775-F0DF-92D3-5D13-DE793988BAE8}"/>
+              </a:ext>
+            </a:extLst>
+          </p:cNvPr>
+          <p:cNvPicPr>
+            <a:picLocks noChangeAspect="1"/>
+          </p:cNvPicPr>
+          <p:nvPr/>
+        </p:nvPicPr>
+        <p:blipFill>
+          <a:blip r:embed="rId3"/>
+          <a:stretch>
+            <a:fillRect/>
+          </a:stretch>
+        </p:blipFill>
+        <p:spPr>
+          <a:xfrm>
+            <a:off x="128560" y="3127246"/>
+            <a:ext cx="5901526" cy="1419354"/>
+          </a:xfrm>
+          <a:prstGeom prst="rect">
+            <a:avLst/>
+          </a:prstGeom>
+          <a:effectLst>
+            <a:reflection blurRad="6350" stA="52000" endA="300" endPos="35000" dir="5400000" sy="-100000" algn="bl" rotWithShape="0"/>
+          </a:effectLst>
           <a:scene3d>
             <a:camera prst="perspectiveRight"/>
+            <a:lightRig rig="threePt" dir="t"/>
+          </a:scene3d>
+        </p:spPr>
+      </p:pic>
+      <p:pic>
+        <p:nvPicPr>
+          <p:cNvPr id="9" name="Picture 8">
+            <a:extLst>
+              <a:ext uri="{FF2B5EF4-FFF2-40B4-BE49-F238E27FC236}">
+                <a16:creationId xmlns:a16="http://schemas.microsoft.com/office/drawing/2014/main" id="{1A00D086-96F3-50AF-93ED-910CE7838B94}"/>
+              </a:ext>
+            </a:extLst>
+          </p:cNvPr>
+          <p:cNvPicPr>
+            <a:picLocks noChangeAspect="1"/>
+          </p:cNvPicPr>
+          <p:nvPr/>
+        </p:nvPicPr>
+        <p:blipFill>
+          <a:blip r:embed="rId4"/>
+          <a:stretch>
+            <a:fillRect/>
+          </a:stretch>
+        </p:blipFill>
+        <p:spPr>
+          <a:xfrm>
+            <a:off x="6189052" y="3131508"/>
+            <a:ext cx="5477019" cy="1448760"/>
+          </a:xfrm>
+          <a:prstGeom prst="rect">
+            <a:avLst/>
+          </a:prstGeom>
+          <a:effectLst>
+            <a:reflection blurRad="6350" stA="52000" endA="300" endPos="35000" dir="5400000" sy="-100000" algn="bl" rotWithShape="0"/>
+          </a:effectLst>
+          <a:scene3d>
+            <a:camera prst="perspectiveLeft"/>
             <a:lightRig rig="threePt" dir="t"/>
           </a:scene3d>
         </p:spPr>
@@ -10293,6 +10358,9 @@
                     <p:cTn id="3" fill="hold">
                       <p:stCondLst>
                         <p:cond delay="indefinite"/>
+                        <p:cond evt="onBegin" delay="0">
+                          <p:tn val="2"/>
+                        </p:cond>
                       </p:stCondLst>
                       <p:childTnLst>
                         <p:par>
@@ -10302,7 +10370,7 @@
                             </p:stCondLst>
                             <p:childTnLst>
                               <p:par>
-                                <p:cTn id="5" presetID="31" presetClass="entr" presetSubtype="0" fill="hold" grpId="0" nodeType="clickEffect">
+                                <p:cTn id="5" presetID="31" presetClass="entr" presetSubtype="0" fill="hold" grpId="0" nodeType="withEffect">
                                   <p:stCondLst>
                                     <p:cond delay="0"/>
                                   </p:stCondLst>
@@ -10402,6 +10470,261 @@
                                         </p:tgtEl>
                                       </p:cBhvr>
                                     </p:animEffect>
+                                  </p:childTnLst>
+                                </p:cTn>
+                              </p:par>
+                              <p:par>
+                                <p:cTn id="11" presetID="10" presetClass="entr" presetSubtype="0" fill="hold" nodeType="withEffect">
+                                  <p:stCondLst>
+                                    <p:cond delay="0"/>
+                                  </p:stCondLst>
+                                  <p:childTnLst>
+                                    <p:set>
+                                      <p:cBhvr>
+                                        <p:cTn id="12" dur="1" fill="hold">
+                                          <p:stCondLst>
+                                            <p:cond delay="0"/>
+                                          </p:stCondLst>
+                                        </p:cTn>
+                                        <p:tgtEl>
+                                          <p:spTgt spid="4"/>
+                                        </p:tgtEl>
+                                        <p:attrNameLst>
+                                          <p:attrName>style.visibility</p:attrName>
+                                        </p:attrNameLst>
+                                      </p:cBhvr>
+                                      <p:to>
+                                        <p:strVal val="visible"/>
+                                      </p:to>
+                                    </p:set>
+                                    <p:animEffect transition="in" filter="fade">
+                                      <p:cBhvr>
+                                        <p:cTn id="13" dur="500"/>
+                                        <p:tgtEl>
+                                          <p:spTgt spid="4"/>
+                                        </p:tgtEl>
+                                      </p:cBhvr>
+                                    </p:animEffect>
+                                  </p:childTnLst>
+                                </p:cTn>
+                              </p:par>
+                            </p:childTnLst>
+                          </p:cTn>
+                        </p:par>
+                      </p:childTnLst>
+                    </p:cTn>
+                  </p:par>
+                  <p:par>
+                    <p:cTn id="14" fill="hold">
+                      <p:stCondLst>
+                        <p:cond delay="indefinite"/>
+                      </p:stCondLst>
+                      <p:childTnLst>
+                        <p:par>
+                          <p:cTn id="15" fill="hold">
+                            <p:stCondLst>
+                              <p:cond delay="0"/>
+                            </p:stCondLst>
+                            <p:childTnLst>
+                              <p:par>
+                                <p:cTn id="16" presetID="42" presetClass="path" presetSubtype="0" accel="50000" decel="50000" fill="hold" nodeType="clickEffect">
+                                  <p:stCondLst>
+                                    <p:cond delay="0"/>
+                                  </p:stCondLst>
+                                  <p:childTnLst>
+                                    <p:animMotion origin="layout" path="M -2.08333E-6 1.48148E-6 L 0.37565 -0.27662 " pathEditMode="relative" rAng="0" ptsTypes="AA">
+                                      <p:cBhvr>
+                                        <p:cTn id="17" dur="2000" fill="hold"/>
+                                        <p:tgtEl>
+                                          <p:spTgt spid="4"/>
+                                        </p:tgtEl>
+                                        <p:attrNameLst>
+                                          <p:attrName>ppt_x</p:attrName>
+                                          <p:attrName>ppt_y</p:attrName>
+                                        </p:attrNameLst>
+                                      </p:cBhvr>
+                                      <p:rCtr x="18776" y="-13843"/>
+                                    </p:animMotion>
+                                  </p:childTnLst>
+                                </p:cTn>
+                              </p:par>
+                            </p:childTnLst>
+                          </p:cTn>
+                        </p:par>
+                      </p:childTnLst>
+                    </p:cTn>
+                  </p:par>
+                  <p:par>
+                    <p:cTn id="18" fill="hold">
+                      <p:stCondLst>
+                        <p:cond delay="indefinite"/>
+                      </p:stCondLst>
+                      <p:childTnLst>
+                        <p:par>
+                          <p:cTn id="19" fill="hold">
+                            <p:stCondLst>
+                              <p:cond delay="0"/>
+                            </p:stCondLst>
+                            <p:childTnLst>
+                              <p:par>
+                                <p:cTn id="20" presetID="42" presetClass="entr" presetSubtype="0" fill="hold" nodeType="clickEffect">
+                                  <p:stCondLst>
+                                    <p:cond delay="0"/>
+                                  </p:stCondLst>
+                                  <p:childTnLst>
+                                    <p:set>
+                                      <p:cBhvr>
+                                        <p:cTn id="21" dur="1" fill="hold">
+                                          <p:stCondLst>
+                                            <p:cond delay="0"/>
+                                          </p:stCondLst>
+                                        </p:cTn>
+                                        <p:tgtEl>
+                                          <p:spTgt spid="7"/>
+                                        </p:tgtEl>
+                                        <p:attrNameLst>
+                                          <p:attrName>style.visibility</p:attrName>
+                                        </p:attrNameLst>
+                                      </p:cBhvr>
+                                      <p:to>
+                                        <p:strVal val="visible"/>
+                                      </p:to>
+                                    </p:set>
+                                    <p:animEffect transition="in" filter="fade">
+                                      <p:cBhvr>
+                                        <p:cTn id="22" dur="750"/>
+                                        <p:tgtEl>
+                                          <p:spTgt spid="7"/>
+                                        </p:tgtEl>
+                                      </p:cBhvr>
+                                    </p:animEffect>
+                                    <p:anim calcmode="lin" valueType="num">
+                                      <p:cBhvr>
+                                        <p:cTn id="23" dur="750" fill="hold"/>
+                                        <p:tgtEl>
+                                          <p:spTgt spid="7"/>
+                                        </p:tgtEl>
+                                        <p:attrNameLst>
+                                          <p:attrName>ppt_x</p:attrName>
+                                        </p:attrNameLst>
+                                      </p:cBhvr>
+                                      <p:tavLst>
+                                        <p:tav tm="0">
+                                          <p:val>
+                                            <p:strVal val="#ppt_x"/>
+                                          </p:val>
+                                        </p:tav>
+                                        <p:tav tm="100000">
+                                          <p:val>
+                                            <p:strVal val="#ppt_x"/>
+                                          </p:val>
+                                        </p:tav>
+                                      </p:tavLst>
+                                    </p:anim>
+                                    <p:anim calcmode="lin" valueType="num">
+                                      <p:cBhvr>
+                                        <p:cTn id="24" dur="750" fill="hold"/>
+                                        <p:tgtEl>
+                                          <p:spTgt spid="7"/>
+                                        </p:tgtEl>
+                                        <p:attrNameLst>
+                                          <p:attrName>ppt_y</p:attrName>
+                                        </p:attrNameLst>
+                                      </p:cBhvr>
+                                      <p:tavLst>
+                                        <p:tav tm="0">
+                                          <p:val>
+                                            <p:strVal val="#ppt_y+.1"/>
+                                          </p:val>
+                                        </p:tav>
+                                        <p:tav tm="100000">
+                                          <p:val>
+                                            <p:strVal val="#ppt_y"/>
+                                          </p:val>
+                                        </p:tav>
+                                      </p:tavLst>
+                                    </p:anim>
+                                  </p:childTnLst>
+                                </p:cTn>
+                              </p:par>
+                              <p:par>
+                                <p:cTn id="25" presetID="42" presetClass="entr" presetSubtype="0" fill="hold" nodeType="withEffect">
+                                  <p:stCondLst>
+                                    <p:cond delay="0"/>
+                                  </p:stCondLst>
+                                  <p:childTnLst>
+                                    <p:set>
+                                      <p:cBhvr>
+                                        <p:cTn id="26" dur="1" fill="hold">
+                                          <p:stCondLst>
+                                            <p:cond delay="0"/>
+                                          </p:stCondLst>
+                                        </p:cTn>
+                                        <p:tgtEl>
+                                          <p:spTgt spid="9"/>
+                                        </p:tgtEl>
+                                        <p:attrNameLst>
+                                          <p:attrName>style.visibility</p:attrName>
+                                        </p:attrNameLst>
+                                      </p:cBhvr>
+                                      <p:to>
+                                        <p:strVal val="visible"/>
+                                      </p:to>
+                                    </p:set>
+                                    <p:animEffect transition="in" filter="fade">
+                                      <p:cBhvr>
+                                        <p:cTn id="27" dur="750"/>
+                                        <p:tgtEl>
+                                          <p:spTgt spid="9"/>
+                                        </p:tgtEl>
+                                      </p:cBhvr>
+                                    </p:animEffect>
+                                    <p:anim calcmode="lin" valueType="num">
+                                      <p:cBhvr>
+                                        <p:cTn id="28" dur="750" fill="hold"/>
+                                        <p:tgtEl>
+                                          <p:spTgt spid="9"/>
+                                        </p:tgtEl>
+                                        <p:attrNameLst>
+                                          <p:attrName>ppt_x</p:attrName>
+                                        </p:attrNameLst>
+                                      </p:cBhvr>
+                                      <p:tavLst>
+                                        <p:tav tm="0">
+                                          <p:val>
+                                            <p:strVal val="#ppt_x"/>
+                                          </p:val>
+                                        </p:tav>
+                                        <p:tav tm="100000">
+                                          <p:val>
+                                            <p:strVal val="#ppt_x"/>
+                                          </p:val>
+                                        </p:tav>
+                                      </p:tavLst>
+                                    </p:anim>
+                                    <p:anim calcmode="lin" valueType="num">
+                                      <p:cBhvr>
+                                        <p:cTn id="29" dur="750" fill="hold"/>
+                                        <p:tgtEl>
+                                          <p:spTgt spid="9"/>
+                                        </p:tgtEl>
+                                        <p:attrNameLst>
+                                          <p:attrName>ppt_y</p:attrName>
+                                        </p:attrNameLst>
+                                      </p:cBhvr>
+                                      <p:tavLst>
+                                        <p:tav tm="0">
+                                          <p:val>
+                                            <p:strVal val="#ppt_y+.1"/>
+                                          </p:val>
+                                        </p:tav>
+                                        <p:tav tm="100000">
+                                          <p:val>
+                                            <p:strVal val="#ppt_y"/>
+                                          </p:val>
+                                        </p:tav>
+                                      </p:tavLst>
+                                    </p:anim>
                                   </p:childTnLst>
                                 </p:cTn>
                               </p:par>
@@ -10474,8 +10797,8 @@
         </p:nvSpPr>
         <p:spPr>
           <a:xfrm>
-            <a:off x="-889000" y="1018373"/>
-            <a:ext cx="8610600" cy="1293028"/>
+            <a:off x="4911634" y="1018373"/>
+            <a:ext cx="2809966" cy="1293028"/>
           </a:xfrm>
         </p:spPr>
         <p:txBody>
@@ -10511,8 +10834,8 @@
         </p:blipFill>
         <p:spPr>
           <a:xfrm>
-            <a:off x="3048000" y="2686050"/>
-            <a:ext cx="6096000" cy="1485900"/>
+            <a:off x="4131742" y="2896436"/>
+            <a:ext cx="4369750" cy="1065127"/>
           </a:xfrm>
           <a:prstGeom prst="rect">
             <a:avLst/>
@@ -10528,6 +10851,191 @@
           </a:effectLst>
         </p:spPr>
       </p:pic>
+      <p:pic>
+        <p:nvPicPr>
+          <p:cNvPr id="5" name="Picture 4">
+            <a:extLst>
+              <a:ext uri="{FF2B5EF4-FFF2-40B4-BE49-F238E27FC236}">
+                <a16:creationId xmlns:a16="http://schemas.microsoft.com/office/drawing/2014/main" id="{08051684-9EF1-33EB-AFF7-224D37983E48}"/>
+              </a:ext>
+            </a:extLst>
+          </p:cNvPr>
+          <p:cNvPicPr>
+            <a:picLocks noChangeAspect="1"/>
+          </p:cNvPicPr>
+          <p:nvPr/>
+        </p:nvPicPr>
+        <p:blipFill>
+          <a:blip r:embed="rId3"/>
+          <a:stretch>
+            <a:fillRect/>
+          </a:stretch>
+        </p:blipFill>
+        <p:spPr>
+          <a:xfrm>
+            <a:off x="176315" y="1745478"/>
+            <a:ext cx="5839924" cy="3107575"/>
+          </a:xfrm>
+          <a:prstGeom prst="rect">
+            <a:avLst/>
+          </a:prstGeom>
+          <a:effectLst>
+            <a:glow rad="63500">
+              <a:schemeClr val="accent5">
+                <a:satMod val="175000"/>
+                <a:alpha val="40000"/>
+              </a:schemeClr>
+            </a:glow>
+          </a:effectLst>
+          <a:scene3d>
+            <a:camera prst="perspectiveRight"/>
+            <a:lightRig rig="threePt" dir="t"/>
+          </a:scene3d>
+        </p:spPr>
+      </p:pic>
+      <p:pic>
+        <p:nvPicPr>
+          <p:cNvPr id="7" name="Picture 6">
+            <a:extLst>
+              <a:ext uri="{FF2B5EF4-FFF2-40B4-BE49-F238E27FC236}">
+                <a16:creationId xmlns:a16="http://schemas.microsoft.com/office/drawing/2014/main" id="{7E782552-8B7C-0389-AFBC-839F19F63562}"/>
+              </a:ext>
+            </a:extLst>
+          </p:cNvPr>
+          <p:cNvPicPr>
+            <a:picLocks noChangeAspect="1"/>
+          </p:cNvPicPr>
+          <p:nvPr/>
+        </p:nvPicPr>
+        <p:blipFill>
+          <a:blip r:embed="rId4"/>
+          <a:stretch>
+            <a:fillRect/>
+          </a:stretch>
+        </p:blipFill>
+        <p:spPr>
+          <a:xfrm>
+            <a:off x="6016239" y="1856620"/>
+            <a:ext cx="6175761" cy="2885290"/>
+          </a:xfrm>
+          <a:prstGeom prst="rect">
+            <a:avLst/>
+          </a:prstGeom>
+          <a:effectLst>
+            <a:glow rad="63500">
+              <a:schemeClr val="accent5">
+                <a:satMod val="175000"/>
+                <a:alpha val="40000"/>
+              </a:schemeClr>
+            </a:glow>
+          </a:effectLst>
+          <a:scene3d>
+            <a:camera prst="perspectiveLeft"/>
+            <a:lightRig rig="threePt" dir="t"/>
+          </a:scene3d>
+        </p:spPr>
+      </p:pic>
+      <p:sp>
+        <p:nvSpPr>
+          <p:cNvPr id="8" name="TextBox 7">
+            <a:extLst>
+              <a:ext uri="{FF2B5EF4-FFF2-40B4-BE49-F238E27FC236}">
+                <a16:creationId xmlns:a16="http://schemas.microsoft.com/office/drawing/2014/main" id="{6A7EC8F6-577A-7F97-244E-BD34A2943790}"/>
+              </a:ext>
+            </a:extLst>
+          </p:cNvPr>
+          <p:cNvSpPr txBox="1"/>
+          <p:nvPr/>
+        </p:nvSpPr>
+        <p:spPr>
+          <a:xfrm>
+            <a:off x="521293" y="5084748"/>
+            <a:ext cx="2185526" cy="369332"/>
+          </a:xfrm>
+          <a:prstGeom prst="rect">
+            <a:avLst/>
+          </a:prstGeom>
+          <a:noFill/>
+        </p:spPr>
+        <p:txBody>
+          <a:bodyPr wrap="square" rtlCol="0">
+            <a:spAutoFit/>
+          </a:bodyPr>
+          <a:lstStyle/>
+          <a:p>
+            <a:r>
+              <a:rPr lang="hu-HU" dirty="0">
+                <a:ln>
+                  <a:solidFill>
+                    <a:schemeClr val="tx2">
+                      <a:lumMod val="75000"/>
+                    </a:schemeClr>
+                  </a:solidFill>
+                </a:ln>
+                <a:effectLst>
+                  <a:outerShdw blurRad="50800" dist="38100" dir="2700000" algn="tl" rotWithShape="0">
+                    <a:prstClr val="black">
+                      <a:alpha val="40000"/>
+                    </a:prstClr>
+                  </a:outerShdw>
+                </a:effectLst>
+              </a:rPr>
+              <a:t>Főoldal</a:t>
+            </a:r>
+          </a:p>
+        </p:txBody>
+      </p:sp>
+      <p:sp>
+        <p:nvSpPr>
+          <p:cNvPr id="9" name="TextBox 8">
+            <a:extLst>
+              <a:ext uri="{FF2B5EF4-FFF2-40B4-BE49-F238E27FC236}">
+                <a16:creationId xmlns:a16="http://schemas.microsoft.com/office/drawing/2014/main" id="{CF85B9A1-FF81-56AB-F9FF-532B85740AA2}"/>
+              </a:ext>
+            </a:extLst>
+          </p:cNvPr>
+          <p:cNvSpPr txBox="1"/>
+          <p:nvPr/>
+        </p:nvSpPr>
+        <p:spPr>
+          <a:xfrm>
+            <a:off x="9485181" y="5006412"/>
+            <a:ext cx="2185526" cy="369332"/>
+          </a:xfrm>
+          <a:prstGeom prst="rect">
+            <a:avLst/>
+          </a:prstGeom>
+          <a:noFill/>
+        </p:spPr>
+        <p:txBody>
+          <a:bodyPr wrap="square" rtlCol="0">
+            <a:spAutoFit/>
+          </a:bodyPr>
+          <a:lstStyle/>
+          <a:p>
+            <a:pPr algn="r"/>
+            <a:r>
+              <a:rPr lang="hu-HU" dirty="0">
+                <a:ln>
+                  <a:solidFill>
+                    <a:schemeClr val="tx2">
+                      <a:lumMod val="75000"/>
+                    </a:schemeClr>
+                  </a:solidFill>
+                </a:ln>
+                <a:effectLst>
+                  <a:outerShdw blurRad="50800" dist="38100" dir="2700000" algn="tl" rotWithShape="0">
+                    <a:prstClr val="black">
+                      <a:alpha val="40000"/>
+                    </a:prstClr>
+                  </a:outerShdw>
+                </a:effectLst>
+              </a:rPr>
+              <a:t>Térképes Kereső</a:t>
+            </a:r>
+          </a:p>
+        </p:txBody>
+      </p:sp>
     </p:spTree>
     <p:extLst>
       <p:ext uri="{BB962C8B-B14F-4D97-AF65-F5344CB8AC3E}">
@@ -10538,9 +11046,18 @@
   <p:clrMapOvr>
     <a:masterClrMapping/>
   </p:clrMapOvr>
-  <p:transition spd="slow">
-    <p:cover/>
-  </p:transition>
+  <mc:AlternateContent xmlns:mc="http://schemas.openxmlformats.org/markup-compatibility/2006">
+    <mc:Choice xmlns:p14="http://schemas.microsoft.com/office/powerpoint/2010/main" Requires="p14">
+      <p:transition spd="slow" p14:dur="2000">
+        <p14:prism isContent="1"/>
+      </p:transition>
+    </mc:Choice>
+    <mc:Fallback>
+      <p:transition spd="slow">
+        <p:fade/>
+      </p:transition>
+    </mc:Fallback>
+  </mc:AlternateContent>
   <p:timing>
     <p:tnLst>
       <p:par>
@@ -10553,6 +11070,9 @@
                     <p:cTn id="3" fill="hold">
                       <p:stCondLst>
                         <p:cond delay="indefinite"/>
+                        <p:cond evt="onBegin" delay="0">
+                          <p:tn val="2"/>
+                        </p:cond>
                       </p:stCondLst>
                       <p:childTnLst>
                         <p:par>
@@ -10562,7 +11082,7 @@
                             </p:stCondLst>
                             <p:childTnLst>
                               <p:par>
-                                <p:cTn id="5" presetID="31" presetClass="entr" presetSubtype="0" fill="hold" grpId="0" nodeType="clickEffect">
+                                <p:cTn id="5" presetID="31" presetClass="entr" presetSubtype="0" fill="hold" grpId="0" nodeType="withEffect">
                                   <p:stCondLst>
                                     <p:cond delay="0"/>
                                   </p:stCondLst>
@@ -10662,6 +11182,469 @@
                                         </p:tgtEl>
                                       </p:cBhvr>
                                     </p:animEffect>
+                                  </p:childTnLst>
+                                </p:cTn>
+                              </p:par>
+                              <p:par>
+                                <p:cTn id="11" presetID="53" presetClass="entr" presetSubtype="16" fill="hold" nodeType="withEffect">
+                                  <p:stCondLst>
+                                    <p:cond delay="0"/>
+                                  </p:stCondLst>
+                                  <p:childTnLst>
+                                    <p:set>
+                                      <p:cBhvr>
+                                        <p:cTn id="12" dur="1" fill="hold">
+                                          <p:stCondLst>
+                                            <p:cond delay="0"/>
+                                          </p:stCondLst>
+                                        </p:cTn>
+                                        <p:tgtEl>
+                                          <p:spTgt spid="4"/>
+                                        </p:tgtEl>
+                                        <p:attrNameLst>
+                                          <p:attrName>style.visibility</p:attrName>
+                                        </p:attrNameLst>
+                                      </p:cBhvr>
+                                      <p:to>
+                                        <p:strVal val="visible"/>
+                                      </p:to>
+                                    </p:set>
+                                    <p:anim calcmode="lin" valueType="num">
+                                      <p:cBhvr>
+                                        <p:cTn id="13" dur="400" fill="hold"/>
+                                        <p:tgtEl>
+                                          <p:spTgt spid="4"/>
+                                        </p:tgtEl>
+                                        <p:attrNameLst>
+                                          <p:attrName>ppt_w</p:attrName>
+                                        </p:attrNameLst>
+                                      </p:cBhvr>
+                                      <p:tavLst>
+                                        <p:tav tm="0">
+                                          <p:val>
+                                            <p:fltVal val="0"/>
+                                          </p:val>
+                                        </p:tav>
+                                        <p:tav tm="100000">
+                                          <p:val>
+                                            <p:strVal val="#ppt_w"/>
+                                          </p:val>
+                                        </p:tav>
+                                      </p:tavLst>
+                                    </p:anim>
+                                    <p:anim calcmode="lin" valueType="num">
+                                      <p:cBhvr>
+                                        <p:cTn id="14" dur="400" fill="hold"/>
+                                        <p:tgtEl>
+                                          <p:spTgt spid="4"/>
+                                        </p:tgtEl>
+                                        <p:attrNameLst>
+                                          <p:attrName>ppt_h</p:attrName>
+                                        </p:attrNameLst>
+                                      </p:cBhvr>
+                                      <p:tavLst>
+                                        <p:tav tm="0">
+                                          <p:val>
+                                            <p:fltVal val="0"/>
+                                          </p:val>
+                                        </p:tav>
+                                        <p:tav tm="100000">
+                                          <p:val>
+                                            <p:strVal val="#ppt_h"/>
+                                          </p:val>
+                                        </p:tav>
+                                      </p:tavLst>
+                                    </p:anim>
+                                    <p:animEffect transition="in" filter="fade">
+                                      <p:cBhvr>
+                                        <p:cTn id="15" dur="400"/>
+                                        <p:tgtEl>
+                                          <p:spTgt spid="4"/>
+                                        </p:tgtEl>
+                                      </p:cBhvr>
+                                    </p:animEffect>
+                                  </p:childTnLst>
+                                </p:cTn>
+                              </p:par>
+                            </p:childTnLst>
+                          </p:cTn>
+                        </p:par>
+                      </p:childTnLst>
+                    </p:cTn>
+                  </p:par>
+                  <p:par>
+                    <p:cTn id="16" fill="hold">
+                      <p:stCondLst>
+                        <p:cond delay="indefinite"/>
+                      </p:stCondLst>
+                      <p:childTnLst>
+                        <p:par>
+                          <p:cTn id="17" fill="hold">
+                            <p:stCondLst>
+                              <p:cond delay="0"/>
+                            </p:stCondLst>
+                            <p:childTnLst>
+                              <p:par>
+                                <p:cTn id="18" presetID="37" presetClass="path" presetSubtype="0" accel="50000" decel="50000" fill="hold" nodeType="clickEffect">
+                                  <p:stCondLst>
+                                    <p:cond delay="0"/>
+                                  </p:stCondLst>
+                                  <p:childTnLst>
+                                    <p:animMotion origin="layout" path="M -0.0293 -0.00046 L 0.06094 -0.10185 C 0.07995 -0.12431 0.13294 -0.07106 0.17213 -0.04792 C 0.2112 -0.02477 0.27669 0.01551 0.29557 0.03796 C 0.32604 0.07176 0.25872 -0.39861 0.28984 -0.36505 " pathEditMode="relative" rAng="0" ptsTypes="AAAAA">
+                                      <p:cBhvr>
+                                        <p:cTn id="19" dur="2500" fill="hold"/>
+                                        <p:tgtEl>
+                                          <p:spTgt spid="4"/>
+                                        </p:tgtEl>
+                                        <p:attrNameLst>
+                                          <p:attrName>ppt_x</p:attrName>
+                                          <p:attrName>ppt_y</p:attrName>
+                                        </p:attrNameLst>
+                                      </p:cBhvr>
+                                      <p:rCtr x="16654" y="-16296"/>
+                                    </p:animMotion>
+                                  </p:childTnLst>
+                                </p:cTn>
+                              </p:par>
+                            </p:childTnLst>
+                          </p:cTn>
+                        </p:par>
+                      </p:childTnLst>
+                    </p:cTn>
+                  </p:par>
+                  <p:par>
+                    <p:cTn id="20" fill="hold">
+                      <p:stCondLst>
+                        <p:cond delay="indefinite"/>
+                      </p:stCondLst>
+                      <p:childTnLst>
+                        <p:par>
+                          <p:cTn id="21" fill="hold">
+                            <p:stCondLst>
+                              <p:cond delay="0"/>
+                            </p:stCondLst>
+                            <p:childTnLst>
+                              <p:par>
+                                <p:cTn id="22" presetID="42" presetClass="entr" presetSubtype="0" fill="hold" nodeType="clickEffect">
+                                  <p:stCondLst>
+                                    <p:cond delay="0"/>
+                                  </p:stCondLst>
+                                  <p:childTnLst>
+                                    <p:set>
+                                      <p:cBhvr>
+                                        <p:cTn id="23" dur="1" fill="hold">
+                                          <p:stCondLst>
+                                            <p:cond delay="0"/>
+                                          </p:stCondLst>
+                                        </p:cTn>
+                                        <p:tgtEl>
+                                          <p:spTgt spid="5"/>
+                                        </p:tgtEl>
+                                        <p:attrNameLst>
+                                          <p:attrName>style.visibility</p:attrName>
+                                        </p:attrNameLst>
+                                      </p:cBhvr>
+                                      <p:to>
+                                        <p:strVal val="visible"/>
+                                      </p:to>
+                                    </p:set>
+                                    <p:animEffect transition="in" filter="fade">
+                                      <p:cBhvr>
+                                        <p:cTn id="24" dur="750"/>
+                                        <p:tgtEl>
+                                          <p:spTgt spid="5"/>
+                                        </p:tgtEl>
+                                      </p:cBhvr>
+                                    </p:animEffect>
+                                    <p:anim calcmode="lin" valueType="num">
+                                      <p:cBhvr>
+                                        <p:cTn id="25" dur="750" fill="hold"/>
+                                        <p:tgtEl>
+                                          <p:spTgt spid="5"/>
+                                        </p:tgtEl>
+                                        <p:attrNameLst>
+                                          <p:attrName>ppt_x</p:attrName>
+                                        </p:attrNameLst>
+                                      </p:cBhvr>
+                                      <p:tavLst>
+                                        <p:tav tm="0">
+                                          <p:val>
+                                            <p:strVal val="#ppt_x"/>
+                                          </p:val>
+                                        </p:tav>
+                                        <p:tav tm="100000">
+                                          <p:val>
+                                            <p:strVal val="#ppt_x"/>
+                                          </p:val>
+                                        </p:tav>
+                                      </p:tavLst>
+                                    </p:anim>
+                                    <p:anim calcmode="lin" valueType="num">
+                                      <p:cBhvr>
+                                        <p:cTn id="26" dur="750" fill="hold"/>
+                                        <p:tgtEl>
+                                          <p:spTgt spid="5"/>
+                                        </p:tgtEl>
+                                        <p:attrNameLst>
+                                          <p:attrName>ppt_y</p:attrName>
+                                        </p:attrNameLst>
+                                      </p:cBhvr>
+                                      <p:tavLst>
+                                        <p:tav tm="0">
+                                          <p:val>
+                                            <p:strVal val="#ppt_y+.1"/>
+                                          </p:val>
+                                        </p:tav>
+                                        <p:tav tm="100000">
+                                          <p:val>
+                                            <p:strVal val="#ppt_y"/>
+                                          </p:val>
+                                        </p:tav>
+                                      </p:tavLst>
+                                    </p:anim>
+                                  </p:childTnLst>
+                                </p:cTn>
+                              </p:par>
+                              <p:par>
+                                <p:cTn id="27" presetID="42" presetClass="entr" presetSubtype="0" fill="hold" nodeType="withEffect">
+                                  <p:stCondLst>
+                                    <p:cond delay="0"/>
+                                  </p:stCondLst>
+                                  <p:childTnLst>
+                                    <p:set>
+                                      <p:cBhvr>
+                                        <p:cTn id="28" dur="1" fill="hold">
+                                          <p:stCondLst>
+                                            <p:cond delay="0"/>
+                                          </p:stCondLst>
+                                        </p:cTn>
+                                        <p:tgtEl>
+                                          <p:spTgt spid="7"/>
+                                        </p:tgtEl>
+                                        <p:attrNameLst>
+                                          <p:attrName>style.visibility</p:attrName>
+                                        </p:attrNameLst>
+                                      </p:cBhvr>
+                                      <p:to>
+                                        <p:strVal val="visible"/>
+                                      </p:to>
+                                    </p:set>
+                                    <p:animEffect transition="in" filter="fade">
+                                      <p:cBhvr>
+                                        <p:cTn id="29" dur="750"/>
+                                        <p:tgtEl>
+                                          <p:spTgt spid="7"/>
+                                        </p:tgtEl>
+                                      </p:cBhvr>
+                                    </p:animEffect>
+                                    <p:anim calcmode="lin" valueType="num">
+                                      <p:cBhvr>
+                                        <p:cTn id="30" dur="750" fill="hold"/>
+                                        <p:tgtEl>
+                                          <p:spTgt spid="7"/>
+                                        </p:tgtEl>
+                                        <p:attrNameLst>
+                                          <p:attrName>ppt_x</p:attrName>
+                                        </p:attrNameLst>
+                                      </p:cBhvr>
+                                      <p:tavLst>
+                                        <p:tav tm="0">
+                                          <p:val>
+                                            <p:strVal val="#ppt_x"/>
+                                          </p:val>
+                                        </p:tav>
+                                        <p:tav tm="100000">
+                                          <p:val>
+                                            <p:strVal val="#ppt_x"/>
+                                          </p:val>
+                                        </p:tav>
+                                      </p:tavLst>
+                                    </p:anim>
+                                    <p:anim calcmode="lin" valueType="num">
+                                      <p:cBhvr>
+                                        <p:cTn id="31" dur="750" fill="hold"/>
+                                        <p:tgtEl>
+                                          <p:spTgt spid="7"/>
+                                        </p:tgtEl>
+                                        <p:attrNameLst>
+                                          <p:attrName>ppt_y</p:attrName>
+                                        </p:attrNameLst>
+                                      </p:cBhvr>
+                                      <p:tavLst>
+                                        <p:tav tm="0">
+                                          <p:val>
+                                            <p:strVal val="#ppt_y+.1"/>
+                                          </p:val>
+                                        </p:tav>
+                                        <p:tav tm="100000">
+                                          <p:val>
+                                            <p:strVal val="#ppt_y"/>
+                                          </p:val>
+                                        </p:tav>
+                                      </p:tavLst>
+                                    </p:anim>
+                                  </p:childTnLst>
+                                </p:cTn>
+                              </p:par>
+                              <p:par>
+                                <p:cTn id="32" presetID="42" presetClass="entr" presetSubtype="0" fill="hold" grpId="0" nodeType="withEffect">
+                                  <p:stCondLst>
+                                    <p:cond delay="0"/>
+                                  </p:stCondLst>
+                                  <p:childTnLst>
+                                    <p:set>
+                                      <p:cBhvr>
+                                        <p:cTn id="33" dur="1" fill="hold">
+                                          <p:stCondLst>
+                                            <p:cond delay="0"/>
+                                          </p:stCondLst>
+                                        </p:cTn>
+                                        <p:tgtEl>
+                                          <p:spTgt spid="9"/>
+                                        </p:tgtEl>
+                                        <p:attrNameLst>
+                                          <p:attrName>style.visibility</p:attrName>
+                                        </p:attrNameLst>
+                                      </p:cBhvr>
+                                      <p:to>
+                                        <p:strVal val="visible"/>
+                                      </p:to>
+                                    </p:set>
+                                    <p:animEffect transition="in" filter="fade">
+                                      <p:cBhvr>
+                                        <p:cTn id="34" dur="750"/>
+                                        <p:tgtEl>
+                                          <p:spTgt spid="9"/>
+                                        </p:tgtEl>
+                                      </p:cBhvr>
+                                    </p:animEffect>
+                                    <p:anim calcmode="lin" valueType="num">
+                                      <p:cBhvr>
+                                        <p:cTn id="35" dur="750" fill="hold"/>
+                                        <p:tgtEl>
+                                          <p:spTgt spid="9"/>
+                                        </p:tgtEl>
+                                        <p:attrNameLst>
+                                          <p:attrName>ppt_x</p:attrName>
+                                        </p:attrNameLst>
+                                      </p:cBhvr>
+                                      <p:tavLst>
+                                        <p:tav tm="0">
+                                          <p:val>
+                                            <p:strVal val="#ppt_x"/>
+                                          </p:val>
+                                        </p:tav>
+                                        <p:tav tm="100000">
+                                          <p:val>
+                                            <p:strVal val="#ppt_x"/>
+                                          </p:val>
+                                        </p:tav>
+                                      </p:tavLst>
+                                    </p:anim>
+                                    <p:anim calcmode="lin" valueType="num">
+                                      <p:cBhvr>
+                                        <p:cTn id="36" dur="750" fill="hold"/>
+                                        <p:tgtEl>
+                                          <p:spTgt spid="9"/>
+                                        </p:tgtEl>
+                                        <p:attrNameLst>
+                                          <p:attrName>ppt_y</p:attrName>
+                                        </p:attrNameLst>
+                                      </p:cBhvr>
+                                      <p:tavLst>
+                                        <p:tav tm="0">
+                                          <p:val>
+                                            <p:strVal val="#ppt_y+.1"/>
+                                          </p:val>
+                                        </p:tav>
+                                        <p:tav tm="100000">
+                                          <p:val>
+                                            <p:strVal val="#ppt_y"/>
+                                          </p:val>
+                                        </p:tav>
+                                      </p:tavLst>
+                                    </p:anim>
+                                  </p:childTnLst>
+                                </p:cTn>
+                              </p:par>
+                              <p:par>
+                                <p:cTn id="37" presetID="42" presetClass="entr" presetSubtype="0" fill="hold" grpId="0" nodeType="withEffect">
+                                  <p:stCondLst>
+                                    <p:cond delay="0"/>
+                                  </p:stCondLst>
+                                  <p:childTnLst>
+                                    <p:set>
+                                      <p:cBhvr>
+                                        <p:cTn id="38" dur="1" fill="hold">
+                                          <p:stCondLst>
+                                            <p:cond delay="0"/>
+                                          </p:stCondLst>
+                                        </p:cTn>
+                                        <p:tgtEl>
+                                          <p:spTgt spid="8"/>
+                                        </p:tgtEl>
+                                        <p:attrNameLst>
+                                          <p:attrName>style.visibility</p:attrName>
+                                        </p:attrNameLst>
+                                      </p:cBhvr>
+                                      <p:to>
+                                        <p:strVal val="visible"/>
+                                      </p:to>
+                                    </p:set>
+                                    <p:animEffect transition="in" filter="fade">
+                                      <p:cBhvr>
+                                        <p:cTn id="39" dur="750"/>
+                                        <p:tgtEl>
+                                          <p:spTgt spid="8"/>
+                                        </p:tgtEl>
+                                      </p:cBhvr>
+                                    </p:animEffect>
+                                    <p:anim calcmode="lin" valueType="num">
+                                      <p:cBhvr>
+                                        <p:cTn id="40" dur="750" fill="hold"/>
+                                        <p:tgtEl>
+                                          <p:spTgt spid="8"/>
+                                        </p:tgtEl>
+                                        <p:attrNameLst>
+                                          <p:attrName>ppt_x</p:attrName>
+                                        </p:attrNameLst>
+                                      </p:cBhvr>
+                                      <p:tavLst>
+                                        <p:tav tm="0">
+                                          <p:val>
+                                            <p:strVal val="#ppt_x"/>
+                                          </p:val>
+                                        </p:tav>
+                                        <p:tav tm="100000">
+                                          <p:val>
+                                            <p:strVal val="#ppt_x"/>
+                                          </p:val>
+                                        </p:tav>
+                                      </p:tavLst>
+                                    </p:anim>
+                                    <p:anim calcmode="lin" valueType="num">
+                                      <p:cBhvr>
+                                        <p:cTn id="41" dur="750" fill="hold"/>
+                                        <p:tgtEl>
+                                          <p:spTgt spid="8"/>
+                                        </p:tgtEl>
+                                        <p:attrNameLst>
+                                          <p:attrName>ppt_y</p:attrName>
+                                        </p:attrNameLst>
+                                      </p:cBhvr>
+                                      <p:tavLst>
+                                        <p:tav tm="0">
+                                          <p:val>
+                                            <p:strVal val="#ppt_y+.1"/>
+                                          </p:val>
+                                        </p:tav>
+                                        <p:tav tm="100000">
+                                          <p:val>
+                                            <p:strVal val="#ppt_y"/>
+                                          </p:val>
+                                        </p:tav>
+                                      </p:tavLst>
+                                    </p:anim>
                                   </p:childTnLst>
                                 </p:cTn>
                               </p:par>
@@ -10694,12 +11677,688 @@
     </p:tnLst>
     <p:bldLst>
       <p:bldP spid="2" grpId="0"/>
+      <p:bldP spid="8" grpId="0"/>
+      <p:bldP spid="9" grpId="0"/>
     </p:bldLst>
   </p:timing>
 </p:sld>
 </file>
 
 <file path=ppt/slides/slide7.xml><?xml version="1.0" encoding="utf-8"?>
+<p:sld xmlns:a="http://schemas.openxmlformats.org/drawingml/2006/main" xmlns:r="http://schemas.openxmlformats.org/officeDocument/2006/relationships" xmlns:p="http://schemas.openxmlformats.org/presentationml/2006/main">
+  <p:cSld>
+    <p:spTree>
+      <p:nvGrpSpPr>
+        <p:cNvPr id="1" name="">
+          <a:extLst>
+            <a:ext uri="{FF2B5EF4-FFF2-40B4-BE49-F238E27FC236}">
+              <a16:creationId xmlns:a16="http://schemas.microsoft.com/office/drawing/2014/main" id="{019F7695-2D09-9443-B24B-9403DBE80EA0}"/>
+            </a:ext>
+          </a:extLst>
+        </p:cNvPr>
+        <p:cNvGrpSpPr/>
+        <p:nvPr/>
+      </p:nvGrpSpPr>
+      <p:grpSpPr>
+        <a:xfrm>
+          <a:off x="0" y="0"/>
+          <a:ext cx="0" cy="0"/>
+          <a:chOff x="0" y="0"/>
+          <a:chExt cx="0" cy="0"/>
+        </a:xfrm>
+      </p:grpSpPr>
+      <p:sp>
+        <p:nvSpPr>
+          <p:cNvPr id="2" name="Cím 1">
+            <a:extLst>
+              <a:ext uri="{FF2B5EF4-FFF2-40B4-BE49-F238E27FC236}">
+                <a16:creationId xmlns:a16="http://schemas.microsoft.com/office/drawing/2014/main" id="{FDDB4306-E875-B607-7A5C-463A97ACE490}"/>
+              </a:ext>
+            </a:extLst>
+          </p:cNvPr>
+          <p:cNvSpPr>
+            <a:spLocks noGrp="1"/>
+          </p:cNvSpPr>
+          <p:nvPr>
+            <p:ph type="title"/>
+          </p:nvPr>
+        </p:nvSpPr>
+        <p:spPr>
+          <a:xfrm>
+            <a:off x="4911634" y="1018373"/>
+            <a:ext cx="2809966" cy="1293028"/>
+          </a:xfrm>
+        </p:spPr>
+        <p:txBody>
+          <a:bodyPr/>
+          <a:lstStyle/>
+          <a:p>
+            <a:r>
+              <a:rPr lang="hu-HU" dirty="0"/>
+              <a:t>Frontend</a:t>
+            </a:r>
+          </a:p>
+        </p:txBody>
+      </p:sp>
+      <p:pic>
+        <p:nvPicPr>
+          <p:cNvPr id="4" name="Kép 3">
+            <a:extLst>
+              <a:ext uri="{FF2B5EF4-FFF2-40B4-BE49-F238E27FC236}">
+                <a16:creationId xmlns:a16="http://schemas.microsoft.com/office/drawing/2014/main" id="{3CFD32C7-6716-BC6C-AC09-43489A5C7683}"/>
+              </a:ext>
+            </a:extLst>
+          </p:cNvPr>
+          <p:cNvPicPr>
+            <a:picLocks noChangeAspect="1"/>
+          </p:cNvPicPr>
+          <p:nvPr/>
+        </p:nvPicPr>
+        <p:blipFill>
+          <a:blip r:embed="rId2"/>
+          <a:stretch>
+            <a:fillRect/>
+          </a:stretch>
+        </p:blipFill>
+        <p:spPr>
+          <a:xfrm>
+            <a:off x="7644064" y="417129"/>
+            <a:ext cx="4369750" cy="1065127"/>
+          </a:xfrm>
+          <a:prstGeom prst="rect">
+            <a:avLst/>
+          </a:prstGeom>
+          <a:effectLst>
+            <a:glow rad="63500">
+              <a:schemeClr val="accent1">
+                <a:satMod val="175000"/>
+                <a:alpha val="40000"/>
+              </a:schemeClr>
+            </a:glow>
+            <a:reflection blurRad="6350" stA="50000" endA="300" endPos="55000" dir="5400000" sy="-100000" algn="bl" rotWithShape="0"/>
+          </a:effectLst>
+        </p:spPr>
+      </p:pic>
+      <p:sp>
+        <p:nvSpPr>
+          <p:cNvPr id="8" name="TextBox 7">
+            <a:extLst>
+              <a:ext uri="{FF2B5EF4-FFF2-40B4-BE49-F238E27FC236}">
+                <a16:creationId xmlns:a16="http://schemas.microsoft.com/office/drawing/2014/main" id="{F531803E-9CAD-74B0-C9CE-6724C0545CCF}"/>
+              </a:ext>
+            </a:extLst>
+          </p:cNvPr>
+          <p:cNvSpPr txBox="1"/>
+          <p:nvPr/>
+        </p:nvSpPr>
+        <p:spPr>
+          <a:xfrm>
+            <a:off x="142995" y="5630255"/>
+            <a:ext cx="2185526" cy="369332"/>
+          </a:xfrm>
+          <a:prstGeom prst="rect">
+            <a:avLst/>
+          </a:prstGeom>
+          <a:noFill/>
+        </p:spPr>
+        <p:txBody>
+          <a:bodyPr wrap="square" rtlCol="0">
+            <a:spAutoFit/>
+          </a:bodyPr>
+          <a:lstStyle/>
+          <a:p>
+            <a:r>
+              <a:rPr lang="hu-HU" dirty="0">
+                <a:ln>
+                  <a:solidFill>
+                    <a:schemeClr val="tx2">
+                      <a:lumMod val="75000"/>
+                    </a:schemeClr>
+                  </a:solidFill>
+                </a:ln>
+                <a:effectLst>
+                  <a:outerShdw blurRad="50800" dist="38100" dir="2700000" algn="tl" rotWithShape="0">
+                    <a:prstClr val="black">
+                      <a:alpha val="40000"/>
+                    </a:prstClr>
+                  </a:outerShdw>
+                </a:effectLst>
+              </a:rPr>
+              <a:t>Bejelentkezés</a:t>
+            </a:r>
+          </a:p>
+        </p:txBody>
+      </p:sp>
+      <p:sp>
+        <p:nvSpPr>
+          <p:cNvPr id="9" name="TextBox 8">
+            <a:extLst>
+              <a:ext uri="{FF2B5EF4-FFF2-40B4-BE49-F238E27FC236}">
+                <a16:creationId xmlns:a16="http://schemas.microsoft.com/office/drawing/2014/main" id="{A6F8EB8F-0E31-F9BE-3A71-EA22B12A6191}"/>
+              </a:ext>
+            </a:extLst>
+          </p:cNvPr>
+          <p:cNvSpPr txBox="1"/>
+          <p:nvPr/>
+        </p:nvSpPr>
+        <p:spPr>
+          <a:xfrm>
+            <a:off x="9647550" y="5630255"/>
+            <a:ext cx="2185526" cy="369332"/>
+          </a:xfrm>
+          <a:prstGeom prst="rect">
+            <a:avLst/>
+          </a:prstGeom>
+          <a:noFill/>
+        </p:spPr>
+        <p:txBody>
+          <a:bodyPr wrap="square" rtlCol="0">
+            <a:spAutoFit/>
+          </a:bodyPr>
+          <a:lstStyle/>
+          <a:p>
+            <a:pPr algn="r"/>
+            <a:r>
+              <a:rPr lang="hu-HU" dirty="0">
+                <a:ln>
+                  <a:solidFill>
+                    <a:schemeClr val="tx2">
+                      <a:lumMod val="75000"/>
+                    </a:schemeClr>
+                  </a:solidFill>
+                </a:ln>
+                <a:effectLst>
+                  <a:outerShdw blurRad="50800" dist="38100" dir="2700000" algn="tl" rotWithShape="0">
+                    <a:prstClr val="black">
+                      <a:alpha val="40000"/>
+                    </a:prstClr>
+                  </a:outerShdw>
+                </a:effectLst>
+              </a:rPr>
+              <a:t>Jutalom rendszer</a:t>
+            </a:r>
+          </a:p>
+        </p:txBody>
+      </p:sp>
+      <p:pic>
+        <p:nvPicPr>
+          <p:cNvPr id="6" name="Picture 5">
+            <a:extLst>
+              <a:ext uri="{FF2B5EF4-FFF2-40B4-BE49-F238E27FC236}">
+                <a16:creationId xmlns:a16="http://schemas.microsoft.com/office/drawing/2014/main" id="{322609F0-553C-3CDB-1D24-B3A46BF06E5A}"/>
+              </a:ext>
+            </a:extLst>
+          </p:cNvPr>
+          <p:cNvPicPr>
+            <a:picLocks noChangeAspect="1"/>
+          </p:cNvPicPr>
+          <p:nvPr/>
+        </p:nvPicPr>
+        <p:blipFill>
+          <a:blip r:embed="rId3"/>
+          <a:stretch>
+            <a:fillRect/>
+          </a:stretch>
+        </p:blipFill>
+        <p:spPr>
+          <a:xfrm>
+            <a:off x="142995" y="2016272"/>
+            <a:ext cx="4216668" cy="2825455"/>
+          </a:xfrm>
+          <a:prstGeom prst="rect">
+            <a:avLst/>
+          </a:prstGeom>
+          <a:effectLst>
+            <a:glow rad="63500">
+              <a:schemeClr val="accent5">
+                <a:satMod val="175000"/>
+                <a:alpha val="40000"/>
+              </a:schemeClr>
+            </a:glow>
+            <a:reflection blurRad="6350" stA="52000" endA="300" endPos="35000" dir="5400000" sy="-100000" algn="bl" rotWithShape="0"/>
+          </a:effectLst>
+          <a:scene3d>
+            <a:camera prst="perspectiveRight"/>
+            <a:lightRig rig="threePt" dir="t"/>
+          </a:scene3d>
+        </p:spPr>
+      </p:pic>
+      <p:pic>
+        <p:nvPicPr>
+          <p:cNvPr id="11" name="Picture 10">
+            <a:extLst>
+              <a:ext uri="{FF2B5EF4-FFF2-40B4-BE49-F238E27FC236}">
+                <a16:creationId xmlns:a16="http://schemas.microsoft.com/office/drawing/2014/main" id="{9AB26539-FDF1-0594-D7F1-0FAFA3E054DC}"/>
+              </a:ext>
+            </a:extLst>
+          </p:cNvPr>
+          <p:cNvPicPr>
+            <a:picLocks noChangeAspect="1"/>
+          </p:cNvPicPr>
+          <p:nvPr/>
+        </p:nvPicPr>
+        <p:blipFill>
+          <a:blip r:embed="rId4"/>
+          <a:stretch>
+            <a:fillRect/>
+          </a:stretch>
+        </p:blipFill>
+        <p:spPr>
+          <a:xfrm>
+            <a:off x="6027633" y="2058100"/>
+            <a:ext cx="6095999" cy="2664583"/>
+          </a:xfrm>
+          <a:prstGeom prst="rect">
+            <a:avLst/>
+          </a:prstGeom>
+          <a:effectLst>
+            <a:glow rad="63500">
+              <a:schemeClr val="accent5">
+                <a:satMod val="175000"/>
+                <a:alpha val="40000"/>
+              </a:schemeClr>
+            </a:glow>
+            <a:reflection blurRad="6350" stA="52000" endA="300" endPos="35000" dir="5400000" sy="-100000" algn="bl" rotWithShape="0"/>
+          </a:effectLst>
+          <a:scene3d>
+            <a:camera prst="perspectiveLeft"/>
+            <a:lightRig rig="threePt" dir="t"/>
+          </a:scene3d>
+        </p:spPr>
+      </p:pic>
+    </p:spTree>
+    <p:extLst>
+      <p:ext uri="{BB962C8B-B14F-4D97-AF65-F5344CB8AC3E}">
+        <p14:creationId xmlns:p14="http://schemas.microsoft.com/office/powerpoint/2010/main" val="65564606"/>
+      </p:ext>
+    </p:extLst>
+  </p:cSld>
+  <p:clrMapOvr>
+    <a:masterClrMapping/>
+  </p:clrMapOvr>
+  <p:timing>
+    <p:tnLst>
+      <p:par>
+        <p:cTn id="1" dur="indefinite" restart="never" nodeType="tmRoot">
+          <p:childTnLst>
+            <p:seq concurrent="1" nextAc="seek">
+              <p:cTn id="2" dur="indefinite" nodeType="mainSeq">
+                <p:childTnLst>
+                  <p:par>
+                    <p:cTn id="3" fill="hold">
+                      <p:stCondLst>
+                        <p:cond delay="indefinite"/>
+                        <p:cond evt="onBegin" delay="0">
+                          <p:tn val="2"/>
+                        </p:cond>
+                      </p:stCondLst>
+                      <p:childTnLst>
+                        <p:par>
+                          <p:cTn id="4" fill="hold">
+                            <p:stCondLst>
+                              <p:cond delay="0"/>
+                            </p:stCondLst>
+                            <p:childTnLst>
+                              <p:par>
+                                <p:cTn id="5" presetID="42" presetClass="entr" presetSubtype="0" fill="hold" nodeType="withEffect">
+                                  <p:stCondLst>
+                                    <p:cond delay="0"/>
+                                  </p:stCondLst>
+                                  <p:childTnLst>
+                                    <p:set>
+                                      <p:cBhvr>
+                                        <p:cTn id="6" dur="1" fill="hold">
+                                          <p:stCondLst>
+                                            <p:cond delay="0"/>
+                                          </p:stCondLst>
+                                        </p:cTn>
+                                        <p:tgtEl>
+                                          <p:spTgt spid="6"/>
+                                        </p:tgtEl>
+                                        <p:attrNameLst>
+                                          <p:attrName>style.visibility</p:attrName>
+                                        </p:attrNameLst>
+                                      </p:cBhvr>
+                                      <p:to>
+                                        <p:strVal val="visible"/>
+                                      </p:to>
+                                    </p:set>
+                                    <p:animEffect transition="in" filter="fade">
+                                      <p:cBhvr>
+                                        <p:cTn id="7" dur="1000"/>
+                                        <p:tgtEl>
+                                          <p:spTgt spid="6"/>
+                                        </p:tgtEl>
+                                      </p:cBhvr>
+                                    </p:animEffect>
+                                    <p:anim calcmode="lin" valueType="num">
+                                      <p:cBhvr>
+                                        <p:cTn id="8" dur="1000" fill="hold"/>
+                                        <p:tgtEl>
+                                          <p:spTgt spid="6"/>
+                                        </p:tgtEl>
+                                        <p:attrNameLst>
+                                          <p:attrName>ppt_x</p:attrName>
+                                        </p:attrNameLst>
+                                      </p:cBhvr>
+                                      <p:tavLst>
+                                        <p:tav tm="0">
+                                          <p:val>
+                                            <p:strVal val="#ppt_x"/>
+                                          </p:val>
+                                        </p:tav>
+                                        <p:tav tm="100000">
+                                          <p:val>
+                                            <p:strVal val="#ppt_x"/>
+                                          </p:val>
+                                        </p:tav>
+                                      </p:tavLst>
+                                    </p:anim>
+                                    <p:anim calcmode="lin" valueType="num">
+                                      <p:cBhvr>
+                                        <p:cTn id="9" dur="1000" fill="hold"/>
+                                        <p:tgtEl>
+                                          <p:spTgt spid="6"/>
+                                        </p:tgtEl>
+                                        <p:attrNameLst>
+                                          <p:attrName>ppt_y</p:attrName>
+                                        </p:attrNameLst>
+                                      </p:cBhvr>
+                                      <p:tavLst>
+                                        <p:tav tm="0">
+                                          <p:val>
+                                            <p:strVal val="#ppt_y+.1"/>
+                                          </p:val>
+                                        </p:tav>
+                                        <p:tav tm="100000">
+                                          <p:val>
+                                            <p:strVal val="#ppt_y"/>
+                                          </p:val>
+                                        </p:tav>
+                                      </p:tavLst>
+                                    </p:anim>
+                                  </p:childTnLst>
+                                </p:cTn>
+                              </p:par>
+                              <p:par>
+                                <p:cTn id="10" presetID="42" presetClass="entr" presetSubtype="0" fill="hold" nodeType="withEffect">
+                                  <p:stCondLst>
+                                    <p:cond delay="0"/>
+                                  </p:stCondLst>
+                                  <p:childTnLst>
+                                    <p:set>
+                                      <p:cBhvr>
+                                        <p:cTn id="11" dur="1" fill="hold">
+                                          <p:stCondLst>
+                                            <p:cond delay="0"/>
+                                          </p:stCondLst>
+                                        </p:cTn>
+                                        <p:tgtEl>
+                                          <p:spTgt spid="11"/>
+                                        </p:tgtEl>
+                                        <p:attrNameLst>
+                                          <p:attrName>style.visibility</p:attrName>
+                                        </p:attrNameLst>
+                                      </p:cBhvr>
+                                      <p:to>
+                                        <p:strVal val="visible"/>
+                                      </p:to>
+                                    </p:set>
+                                    <p:animEffect transition="in" filter="fade">
+                                      <p:cBhvr>
+                                        <p:cTn id="12" dur="1000"/>
+                                        <p:tgtEl>
+                                          <p:spTgt spid="11"/>
+                                        </p:tgtEl>
+                                      </p:cBhvr>
+                                    </p:animEffect>
+                                    <p:anim calcmode="lin" valueType="num">
+                                      <p:cBhvr>
+                                        <p:cTn id="13" dur="1000" fill="hold"/>
+                                        <p:tgtEl>
+                                          <p:spTgt spid="11"/>
+                                        </p:tgtEl>
+                                        <p:attrNameLst>
+                                          <p:attrName>ppt_x</p:attrName>
+                                        </p:attrNameLst>
+                                      </p:cBhvr>
+                                      <p:tavLst>
+                                        <p:tav tm="0">
+                                          <p:val>
+                                            <p:strVal val="#ppt_x"/>
+                                          </p:val>
+                                        </p:tav>
+                                        <p:tav tm="100000">
+                                          <p:val>
+                                            <p:strVal val="#ppt_x"/>
+                                          </p:val>
+                                        </p:tav>
+                                      </p:tavLst>
+                                    </p:anim>
+                                    <p:anim calcmode="lin" valueType="num">
+                                      <p:cBhvr>
+                                        <p:cTn id="14" dur="1000" fill="hold"/>
+                                        <p:tgtEl>
+                                          <p:spTgt spid="11"/>
+                                        </p:tgtEl>
+                                        <p:attrNameLst>
+                                          <p:attrName>ppt_y</p:attrName>
+                                        </p:attrNameLst>
+                                      </p:cBhvr>
+                                      <p:tavLst>
+                                        <p:tav tm="0">
+                                          <p:val>
+                                            <p:strVal val="#ppt_y+.1"/>
+                                          </p:val>
+                                        </p:tav>
+                                        <p:tav tm="100000">
+                                          <p:val>
+                                            <p:strVal val="#ppt_y"/>
+                                          </p:val>
+                                        </p:tav>
+                                      </p:tavLst>
+                                    </p:anim>
+                                  </p:childTnLst>
+                                </p:cTn>
+                              </p:par>
+                              <p:par>
+                                <p:cTn id="15" presetID="42" presetClass="entr" presetSubtype="0" fill="hold" grpId="0" nodeType="withEffect">
+                                  <p:stCondLst>
+                                    <p:cond delay="0"/>
+                                  </p:stCondLst>
+                                  <p:childTnLst>
+                                    <p:set>
+                                      <p:cBhvr>
+                                        <p:cTn id="16" dur="1" fill="hold">
+                                          <p:stCondLst>
+                                            <p:cond delay="0"/>
+                                          </p:stCondLst>
+                                        </p:cTn>
+                                        <p:tgtEl>
+                                          <p:spTgt spid="9"/>
+                                        </p:tgtEl>
+                                        <p:attrNameLst>
+                                          <p:attrName>style.visibility</p:attrName>
+                                        </p:attrNameLst>
+                                      </p:cBhvr>
+                                      <p:to>
+                                        <p:strVal val="visible"/>
+                                      </p:to>
+                                    </p:set>
+                                    <p:animEffect transition="in" filter="fade">
+                                      <p:cBhvr>
+                                        <p:cTn id="17" dur="1000"/>
+                                        <p:tgtEl>
+                                          <p:spTgt spid="9"/>
+                                        </p:tgtEl>
+                                      </p:cBhvr>
+                                    </p:animEffect>
+                                    <p:anim calcmode="lin" valueType="num">
+                                      <p:cBhvr>
+                                        <p:cTn id="18" dur="1000" fill="hold"/>
+                                        <p:tgtEl>
+                                          <p:spTgt spid="9"/>
+                                        </p:tgtEl>
+                                        <p:attrNameLst>
+                                          <p:attrName>ppt_x</p:attrName>
+                                        </p:attrNameLst>
+                                      </p:cBhvr>
+                                      <p:tavLst>
+                                        <p:tav tm="0">
+                                          <p:val>
+                                            <p:strVal val="#ppt_x"/>
+                                          </p:val>
+                                        </p:tav>
+                                        <p:tav tm="100000">
+                                          <p:val>
+                                            <p:strVal val="#ppt_x"/>
+                                          </p:val>
+                                        </p:tav>
+                                      </p:tavLst>
+                                    </p:anim>
+                                    <p:anim calcmode="lin" valueType="num">
+                                      <p:cBhvr>
+                                        <p:cTn id="19" dur="1000" fill="hold"/>
+                                        <p:tgtEl>
+                                          <p:spTgt spid="9"/>
+                                        </p:tgtEl>
+                                        <p:attrNameLst>
+                                          <p:attrName>ppt_y</p:attrName>
+                                        </p:attrNameLst>
+                                      </p:cBhvr>
+                                      <p:tavLst>
+                                        <p:tav tm="0">
+                                          <p:val>
+                                            <p:strVal val="#ppt_y+.1"/>
+                                          </p:val>
+                                        </p:tav>
+                                        <p:tav tm="100000">
+                                          <p:val>
+                                            <p:strVal val="#ppt_y"/>
+                                          </p:val>
+                                        </p:tav>
+                                      </p:tavLst>
+                                    </p:anim>
+                                  </p:childTnLst>
+                                </p:cTn>
+                              </p:par>
+                              <p:par>
+                                <p:cTn id="20" presetID="42" presetClass="entr" presetSubtype="0" fill="hold" grpId="0" nodeType="withEffect">
+                                  <p:stCondLst>
+                                    <p:cond delay="0"/>
+                                  </p:stCondLst>
+                                  <p:childTnLst>
+                                    <p:set>
+                                      <p:cBhvr>
+                                        <p:cTn id="21" dur="1" fill="hold">
+                                          <p:stCondLst>
+                                            <p:cond delay="0"/>
+                                          </p:stCondLst>
+                                        </p:cTn>
+                                        <p:tgtEl>
+                                          <p:spTgt spid="8"/>
+                                        </p:tgtEl>
+                                        <p:attrNameLst>
+                                          <p:attrName>style.visibility</p:attrName>
+                                        </p:attrNameLst>
+                                      </p:cBhvr>
+                                      <p:to>
+                                        <p:strVal val="visible"/>
+                                      </p:to>
+                                    </p:set>
+                                    <p:animEffect transition="in" filter="fade">
+                                      <p:cBhvr>
+                                        <p:cTn id="22" dur="1000"/>
+                                        <p:tgtEl>
+                                          <p:spTgt spid="8"/>
+                                        </p:tgtEl>
+                                      </p:cBhvr>
+                                    </p:animEffect>
+                                    <p:anim calcmode="lin" valueType="num">
+                                      <p:cBhvr>
+                                        <p:cTn id="23" dur="1000" fill="hold"/>
+                                        <p:tgtEl>
+                                          <p:spTgt spid="8"/>
+                                        </p:tgtEl>
+                                        <p:attrNameLst>
+                                          <p:attrName>ppt_x</p:attrName>
+                                        </p:attrNameLst>
+                                      </p:cBhvr>
+                                      <p:tavLst>
+                                        <p:tav tm="0">
+                                          <p:val>
+                                            <p:strVal val="#ppt_x"/>
+                                          </p:val>
+                                        </p:tav>
+                                        <p:tav tm="100000">
+                                          <p:val>
+                                            <p:strVal val="#ppt_x"/>
+                                          </p:val>
+                                        </p:tav>
+                                      </p:tavLst>
+                                    </p:anim>
+                                    <p:anim calcmode="lin" valueType="num">
+                                      <p:cBhvr>
+                                        <p:cTn id="24" dur="1000" fill="hold"/>
+                                        <p:tgtEl>
+                                          <p:spTgt spid="8"/>
+                                        </p:tgtEl>
+                                        <p:attrNameLst>
+                                          <p:attrName>ppt_y</p:attrName>
+                                        </p:attrNameLst>
+                                      </p:cBhvr>
+                                      <p:tavLst>
+                                        <p:tav tm="0">
+                                          <p:val>
+                                            <p:strVal val="#ppt_y+.1"/>
+                                          </p:val>
+                                        </p:tav>
+                                        <p:tav tm="100000">
+                                          <p:val>
+                                            <p:strVal val="#ppt_y"/>
+                                          </p:val>
+                                        </p:tav>
+                                      </p:tavLst>
+                                    </p:anim>
+                                  </p:childTnLst>
+                                </p:cTn>
+                              </p:par>
+                            </p:childTnLst>
+                          </p:cTn>
+                        </p:par>
+                      </p:childTnLst>
+                    </p:cTn>
+                  </p:par>
+                </p:childTnLst>
+              </p:cTn>
+              <p:prevCondLst>
+                <p:cond evt="onPrev" delay="0">
+                  <p:tgtEl>
+                    <p:sldTgt/>
+                  </p:tgtEl>
+                </p:cond>
+              </p:prevCondLst>
+              <p:nextCondLst>
+                <p:cond evt="onNext" delay="0">
+                  <p:tgtEl>
+                    <p:sldTgt/>
+                  </p:tgtEl>
+                </p:cond>
+              </p:nextCondLst>
+            </p:seq>
+          </p:childTnLst>
+        </p:cTn>
+      </p:par>
+    </p:tnLst>
+    <p:bldLst>
+      <p:bldP spid="8" grpId="0"/>
+      <p:bldP spid="9" grpId="0"/>
+    </p:bldLst>
+  </p:timing>
+</p:sld>
+</file>
+
+<file path=ppt/slides/slide8.xml><?xml version="1.0" encoding="utf-8"?>
 <p:sld xmlns:a="http://schemas.openxmlformats.org/drawingml/2006/main" xmlns:r="http://schemas.openxmlformats.org/officeDocument/2006/relationships" xmlns:p="http://schemas.openxmlformats.org/presentationml/2006/main">
   <p:cSld>
     <p:bg>
@@ -10926,6 +12585,9 @@
                     <p:cTn id="3" fill="hold">
                       <p:stCondLst>
                         <p:cond delay="indefinite"/>
+                        <p:cond evt="onBegin" delay="0">
+                          <p:tn val="2"/>
+                        </p:cond>
                       </p:stCondLst>
                       <p:childTnLst>
                         <p:par>
@@ -10935,7 +12597,7 @@
                             </p:stCondLst>
                             <p:childTnLst>
                               <p:par>
-                                <p:cTn id="5" presetID="42" presetClass="entr" presetSubtype="0" fill="hold" grpId="0" nodeType="clickEffect">
+                                <p:cTn id="5" presetID="42" presetClass="entr" presetSubtype="0" fill="hold" grpId="0" nodeType="withEffect">
                                   <p:stCondLst>
                                     <p:cond delay="0"/>
                                   </p:stCondLst>
@@ -11165,7 +12827,7 @@
 </p:sld>
 </file>
 
-<file path=ppt/slides/slide8.xml><?xml version="1.0" encoding="utf-8"?>
+<file path=ppt/slides/slide9.xml><?xml version="1.0" encoding="utf-8"?>
 <p:sld xmlns:a="http://schemas.openxmlformats.org/drawingml/2006/main" xmlns:r="http://schemas.openxmlformats.org/officeDocument/2006/relationships" xmlns:p="http://schemas.openxmlformats.org/presentationml/2006/main">
   <p:cSld>
     <p:bg>
@@ -12240,6 +13902,15 @@
 </file>
 
 <file path=customXml/item1.xml><?xml version="1.0" encoding="utf-8"?>
+<?mso-contentType ?>
+<FormTemplates xmlns="http://schemas.microsoft.com/sharepoint/v3/contenttype/forms">
+  <Display>DocumentLibraryForm</Display>
+  <Edit>DocumentLibraryForm</Edit>
+  <New>DocumentLibraryForm</New>
+</FormTemplates>
+</file>
+
+<file path=customXml/item2.xml><?xml version="1.0" encoding="utf-8"?>
 <ct:contentTypeSchema xmlns:ct="http://schemas.microsoft.com/office/2006/metadata/contentType" xmlns:ma="http://schemas.microsoft.com/office/2006/metadata/properties/metaAttributes" ct:_="" ma:_="" ma:contentTypeName="Document" ma:contentTypeID="0x01010079F111ED35F8CC479449609E8A0923A6" ma:contentTypeVersion="11" ma:contentTypeDescription="Create a new document." ma:contentTypeScope="" ma:versionID="1c2eb7a32e66fb6e4260f3771546a5e2">
   <xsd:schema xmlns:xsd="http://www.w3.org/2001/XMLSchema" xmlns:xs="http://www.w3.org/2001/XMLSchema" xmlns:p="http://schemas.microsoft.com/office/2006/metadata/properties" xmlns:ns2="71af3243-3dd4-4a8d-8c0d-dd76da1f02a5" xmlns:ns3="16c05727-aa75-4e4a-9b5f-8a80a1165891" targetNamespace="http://schemas.microsoft.com/office/2006/metadata/properties" ma:root="true" ma:fieldsID="04e1f6479c48b08974ba73b5ca973489" ns2:_="" ns3:_="">
     <xsd:import namespace="71af3243-3dd4-4a8d-8c0d-dd76da1f02a5"/>
@@ -12450,15 +14121,6 @@
 </ct:contentTypeSchema>
 </file>
 
-<file path=customXml/item2.xml><?xml version="1.0" encoding="utf-8"?>
-<?mso-contentType ?>
-<FormTemplates xmlns="http://schemas.microsoft.com/sharepoint/v3/contenttype/forms">
-  <Display>DocumentLibraryForm</Display>
-  <Edit>DocumentLibraryForm</Edit>
-  <New>DocumentLibraryForm</New>
-</FormTemplates>
-</file>
-
 <file path=customXml/item3.xml><?xml version="1.0" encoding="utf-8"?>
 <p:properties xmlns:p="http://schemas.microsoft.com/office/2006/metadata/properties" xmlns:xsi="http://www.w3.org/2001/XMLSchema-instance" xmlns:pc="http://schemas.microsoft.com/office/infopath/2007/PartnerControls">
   <documentManagement>
@@ -12468,6 +14130,14 @@
 </file>
 
 <file path=customXml/itemProps1.xml><?xml version="1.0" encoding="utf-8"?>
+<ds:datastoreItem xmlns:ds="http://schemas.openxmlformats.org/officeDocument/2006/customXml" ds:itemID="{C776B320-E975-4049-B758-D52F391461D4}">
+  <ds:schemaRefs>
+    <ds:schemaRef ds:uri="http://schemas.microsoft.com/sharepoint/v3/contenttype/forms"/>
+  </ds:schemaRefs>
+</ds:datastoreItem>
+</file>
+
+<file path=customXml/itemProps2.xml><?xml version="1.0" encoding="utf-8"?>
 <ds:datastoreItem xmlns:ds="http://schemas.openxmlformats.org/officeDocument/2006/customXml" ds:itemID="{D78A686E-C507-4F7D-AEA6-9FFC7523CBCE}">
   <ds:schemaRefs>
     <ds:schemaRef ds:uri="http://schemas.microsoft.com/office/2006/metadata/contentType"/>
@@ -12482,14 +14152,6 @@
     <ds:schemaRef ds:uri="http://purl.org/dc/elements/1.1/"/>
     <ds:schemaRef ds:uri="http://purl.org/dc/terms/"/>
     <ds:schemaRef ds:uri="http://schemas.microsoft.com/internal/obd"/>
-  </ds:schemaRefs>
-</ds:datastoreItem>
-</file>
-
-<file path=customXml/itemProps2.xml><?xml version="1.0" encoding="utf-8"?>
-<ds:datastoreItem xmlns:ds="http://schemas.openxmlformats.org/officeDocument/2006/customXml" ds:itemID="{C776B320-E975-4049-B758-D52F391461D4}">
-  <ds:schemaRefs>
-    <ds:schemaRef ds:uri="http://schemas.microsoft.com/sharepoint/v3/contenttype/forms"/>
   </ds:schemaRefs>
 </ds:datastoreItem>
 </file>

</xml_diff>